<commit_message>
Update Add water view in GUI Layout PowerPoint
</commit_message>
<xml_diff>
--- a/resources/GUI Layout.pptx
+++ b/resources/GUI Layout.pptx
@@ -108,6 +108,11 @@
       </a:defRPr>
     </a:lvl9pPr>
   </p:defaultTextStyle>
+  <p:extLst>
+    <p:ext uri="{EFAFB233-063F-42B5-8137-9DF3F51BA10A}">
+      <p15:sldGuideLst xmlns:p15="http://schemas.microsoft.com/office/powerpoint/2012/main"/>
+    </p:ext>
+  </p:extLst>
 </p:presentation>
 </file>
 
@@ -4679,8 +4684,8 @@
         </p:nvSpPr>
         <p:spPr>
           <a:xfrm>
-            <a:off x="2519066" y="2459001"/>
-            <a:ext cx="2004970" cy="276999"/>
+            <a:off x="601209" y="2459001"/>
+            <a:ext cx="5830349" cy="276999"/>
           </a:xfrm>
           <a:prstGeom prst="rect">
             <a:avLst/>
@@ -4779,6 +4784,78 @@
             <a:r>
               <a:rPr lang="en-AU" sz="1100" b="1" dirty="0"/>
               <a:t>Add water</a:t>
+            </a:r>
+          </a:p>
+        </p:txBody>
+      </p:sp>
+      <p:sp>
+        <p:nvSpPr>
+          <p:cNvPr id="42" name="TextBox 41">
+            <a:extLst>
+              <a:ext uri="{FF2B5EF4-FFF2-40B4-BE49-F238E27FC236}">
+                <a16:creationId xmlns:a16="http://schemas.microsoft.com/office/drawing/2014/main" id="{C7EA5C51-636C-42CB-9A37-6AD0AC2A255A}"/>
+              </a:ext>
+            </a:extLst>
+          </p:cNvPr>
+          <p:cNvSpPr txBox="1"/>
+          <p:nvPr/>
+        </p:nvSpPr>
+        <p:spPr>
+          <a:xfrm>
+            <a:off x="603261" y="2057412"/>
+            <a:ext cx="5830349" cy="369332"/>
+          </a:xfrm>
+          <a:prstGeom prst="rect">
+            <a:avLst/>
+          </a:prstGeom>
+          <a:noFill/>
+        </p:spPr>
+        <p:txBody>
+          <a:bodyPr wrap="square" rtlCol="0">
+            <a:spAutoFit/>
+          </a:bodyPr>
+          <a:lstStyle/>
+          <a:p>
+            <a:pPr algn="ctr"/>
+            <a:r>
+              <a:rPr lang="en-AU" b="1" dirty="0"/>
+              <a:t>Daily</a:t>
+            </a:r>
+          </a:p>
+        </p:txBody>
+      </p:sp>
+      <p:sp>
+        <p:nvSpPr>
+          <p:cNvPr id="43" name="TextBox 42">
+            <a:extLst>
+              <a:ext uri="{FF2B5EF4-FFF2-40B4-BE49-F238E27FC236}">
+                <a16:creationId xmlns:a16="http://schemas.microsoft.com/office/drawing/2014/main" id="{DC950C8B-1DD1-48FA-8034-0653DF1A4E32}"/>
+              </a:ext>
+            </a:extLst>
+          </p:cNvPr>
+          <p:cNvSpPr txBox="1"/>
+          <p:nvPr/>
+        </p:nvSpPr>
+        <p:spPr>
+          <a:xfrm>
+            <a:off x="9045276" y="2059363"/>
+            <a:ext cx="1994636" cy="369332"/>
+          </a:xfrm>
+          <a:prstGeom prst="rect">
+            <a:avLst/>
+          </a:prstGeom>
+          <a:noFill/>
+        </p:spPr>
+        <p:txBody>
+          <a:bodyPr wrap="square" rtlCol="0">
+            <a:spAutoFit/>
+          </a:bodyPr>
+          <a:lstStyle/>
+          <a:p>
+            <a:pPr algn="ctr"/>
+            <a:r>
+              <a:rPr lang="en-AU" b="1" dirty="0"/>
+              <a:t>Daily</a:t>
             </a:r>
           </a:p>
         </p:txBody>

</xml_diff>